<commit_message>
Added Dr. York's Bitbucket username to L1 slides. Added all instructor Bitbucket usernames and issue tracker instructions to Lab index page
</commit_message>
<xml_diff>
--- a/notes/L1/Lsn1.pptx
+++ b/notes/L1/Lsn1.pptx
@@ -4205,7 +4205,7 @@
               <a:pPr>
                 <a:defRPr/>
               </a:pPr>
-              <a:t>9 August 2017</a:t>
+              <a:t>15 August 2017</a:t>
             </a:fld>
             <a:endParaRPr lang="en-US">
               <a:solidFill>
@@ -4445,7 +4445,7 @@
               <a:pPr>
                 <a:defRPr/>
               </a:pPr>
-              <a:t>9 August 2017</a:t>
+              <a:t>15 August 2017</a:t>
             </a:fld>
             <a:endParaRPr lang="en-US">
               <a:solidFill>
@@ -4670,7 +4670,7 @@
               <a:pPr>
                 <a:defRPr/>
               </a:pPr>
-              <a:t>9 August 2017</a:t>
+              <a:t>15 August 2017</a:t>
             </a:fld>
             <a:endParaRPr lang="en-US">
               <a:solidFill>
@@ -4999,7 +4999,7 @@
               <a:pPr>
                 <a:defRPr/>
               </a:pPr>
-              <a:t>9 August 2017</a:t>
+              <a:t>15 August 2017</a:t>
             </a:fld>
             <a:endParaRPr lang="en-US">
               <a:solidFill>
@@ -5474,7 +5474,7 @@
               <a:pPr>
                 <a:defRPr/>
               </a:pPr>
-              <a:t>9 August 2017</a:t>
+              <a:t>15 August 2017</a:t>
             </a:fld>
             <a:endParaRPr lang="en-US">
               <a:solidFill>
@@ -5640,7 +5640,7 @@
               <a:pPr>
                 <a:defRPr/>
               </a:pPr>
-              <a:t>9 August 2017</a:t>
+              <a:t>15 August 2017</a:t>
             </a:fld>
             <a:endParaRPr lang="en-US">
               <a:solidFill>
@@ -5783,7 +5783,7 @@
               <a:pPr>
                 <a:defRPr/>
               </a:pPr>
-              <a:t>9 August 2017</a:t>
+              <a:t>15 August 2017</a:t>
             </a:fld>
             <a:endParaRPr lang="en-US">
               <a:solidFill>
@@ -6108,7 +6108,7 @@
               <a:pPr>
                 <a:defRPr/>
               </a:pPr>
-              <a:t>9 August 2017</a:t>
+              <a:t>15 August 2017</a:t>
             </a:fld>
             <a:endParaRPr lang="en-US">
               <a:solidFill>
@@ -6410,7 +6410,7 @@
               <a:pPr>
                 <a:defRPr/>
               </a:pPr>
-              <a:t>9 August 2017</a:t>
+              <a:t>15 August 2017</a:t>
             </a:fld>
             <a:endParaRPr lang="en-US">
               <a:solidFill>
@@ -6628,7 +6628,7 @@
               <a:pPr>
                 <a:defRPr/>
               </a:pPr>
-              <a:t>9 August 2017</a:t>
+              <a:t>15 August 2017</a:t>
             </a:fld>
             <a:endParaRPr lang="en-US">
               <a:solidFill>
@@ -6856,7 +6856,7 @@
               <a:pPr>
                 <a:defRPr/>
               </a:pPr>
-              <a:t>9 August 2017</a:t>
+              <a:t>15 August 2017</a:t>
             </a:fld>
             <a:endParaRPr lang="en-US">
               <a:solidFill>
@@ -7052,7 +7052,7 @@
               <a:pPr>
                 <a:defRPr/>
               </a:pPr>
-              <a:t>9 August 2017</a:t>
+              <a:t>15 August 2017</a:t>
             </a:fld>
             <a:endParaRPr lang="en-US">
               <a:solidFill>
@@ -8089,7 +8089,7 @@
               <a:pPr>
                 <a:defRPr/>
               </a:pPr>
-              <a:t>9 August 2017</a:t>
+              <a:t>15 August 2017</a:t>
             </a:fld>
             <a:endParaRPr lang="en-US">
               <a:solidFill>
@@ -8329,7 +8329,7 @@
               <a:pPr>
                 <a:defRPr/>
               </a:pPr>
-              <a:t>9 August 2017</a:t>
+              <a:t>15 August 2017</a:t>
             </a:fld>
             <a:endParaRPr lang="en-US">
               <a:solidFill>
@@ -8665,7 +8665,7 @@
               <a:pPr>
                 <a:defRPr/>
               </a:pPr>
-              <a:t>9 August 2017</a:t>
+              <a:t>15 August 2017</a:t>
             </a:fld>
             <a:endParaRPr lang="en-US">
               <a:solidFill>
@@ -9140,7 +9140,7 @@
               <a:pPr>
                 <a:defRPr/>
               </a:pPr>
-              <a:t>9 August 2017</a:t>
+              <a:t>15 August 2017</a:t>
             </a:fld>
             <a:endParaRPr lang="en-US">
               <a:solidFill>
@@ -9306,7 +9306,7 @@
               <a:pPr>
                 <a:defRPr/>
               </a:pPr>
-              <a:t>9 August 2017</a:t>
+              <a:t>15 August 2017</a:t>
             </a:fld>
             <a:endParaRPr lang="en-US">
               <a:solidFill>
@@ -9449,7 +9449,7 @@
               <a:pPr>
                 <a:defRPr/>
               </a:pPr>
-              <a:t>9 August 2017</a:t>
+              <a:t>15 August 2017</a:t>
             </a:fld>
             <a:endParaRPr lang="en-US">
               <a:solidFill>
@@ -9774,7 +9774,7 @@
               <a:pPr>
                 <a:defRPr/>
               </a:pPr>
-              <a:t>9 August 2017</a:t>
+              <a:t>15 August 2017</a:t>
             </a:fld>
             <a:endParaRPr lang="en-US">
               <a:solidFill>
@@ -10076,7 +10076,7 @@
               <a:pPr>
                 <a:defRPr/>
               </a:pPr>
-              <a:t>9 August 2017</a:t>
+              <a:t>15 August 2017</a:t>
             </a:fld>
             <a:endParaRPr lang="en-US">
               <a:solidFill>
@@ -10294,7 +10294,7 @@
               <a:pPr>
                 <a:defRPr/>
               </a:pPr>
-              <a:t>9 August 2017</a:t>
+              <a:t>15 August 2017</a:t>
             </a:fld>
             <a:endParaRPr lang="en-US">
               <a:solidFill>
@@ -10522,7 +10522,7 @@
               <a:pPr>
                 <a:defRPr/>
               </a:pPr>
-              <a:t>9 August 2017</a:t>
+              <a:t>15 August 2017</a:t>
             </a:fld>
             <a:endParaRPr lang="en-US">
               <a:solidFill>
@@ -10892,7 +10892,7 @@
               <a:pPr>
                 <a:defRPr/>
               </a:pPr>
-              <a:t>9 August 2017</a:t>
+              <a:t>15 August 2017</a:t>
             </a:fld>
             <a:endParaRPr lang="en-US">
               <a:solidFill>
@@ -14775,7 +14775,7 @@
               <a:pPr eaLnBrk="0" hangingPunct="0">
                 <a:defRPr/>
               </a:pPr>
-              <a:t>9 August 2017</a:t>
+              <a:t>15 August 2017</a:t>
             </a:fld>
             <a:endParaRPr lang="en-US">
               <a:solidFill>
@@ -15816,7 +15816,7 @@
               <a:pPr eaLnBrk="0" hangingPunct="0">
                 <a:defRPr/>
               </a:pPr>
-              <a:t>9 August 2017</a:t>
+              <a:t>15 August 2017</a:t>
             </a:fld>
             <a:endParaRPr lang="en-US">
               <a:solidFill>
@@ -17274,7 +17274,7 @@
                 <a:latin typeface="Times New Roman" pitchFamily="18" charset="0"/>
               </a:rPr>
               <a:pPr/>
-              <a:t>9 August 2017</a:t>
+              <a:t>15 August 2017</a:t>
             </a:fld>
             <a:endParaRPr lang="en-US" smtClean="0">
               <a:latin typeface="Times New Roman" pitchFamily="18" charset="0"/>
@@ -20954,7 +20954,7 @@
               <a:pPr>
                 <a:defRPr/>
               </a:pPr>
-              <a:t>9 August 2017</a:t>
+              <a:t>15 August 2017</a:t>
             </a:fld>
             <a:endParaRPr lang="en-US">
               <a:solidFill>
@@ -21528,7 +21528,7 @@
                 <a:latin typeface="Times New Roman" pitchFamily="18" charset="0"/>
               </a:rPr>
               <a:pPr/>
-              <a:t>9 August 2017</a:t>
+              <a:t>15 August 2017</a:t>
             </a:fld>
             <a:endParaRPr lang="en-US" smtClean="0">
               <a:latin typeface="Times New Roman" pitchFamily="18" charset="0"/>
@@ -25749,7 +25749,7 @@
                 <a:latin typeface="Times New Roman" pitchFamily="18" charset="0"/>
               </a:rPr>
               <a:pPr/>
-              <a:t>9 August 2017</a:t>
+              <a:t>15 August 2017</a:t>
             </a:fld>
             <a:endParaRPr lang="en-US" smtClean="0">
               <a:latin typeface="Times New Roman" pitchFamily="18" charset="0"/>
@@ -28242,7 +28242,7 @@
                 <a:latin typeface="Times New Roman" pitchFamily="18" charset="0"/>
               </a:rPr>
               <a:pPr/>
-              <a:t>9 August 2017</a:t>
+              <a:t>15 August 2017</a:t>
             </a:fld>
             <a:endParaRPr lang="en-US" smtClean="0">
               <a:latin typeface="Times New Roman" pitchFamily="18" charset="0"/>
@@ -28670,7 +28670,7 @@
                 <a:latin typeface="Times New Roman" pitchFamily="18" charset="0"/>
               </a:rPr>
               <a:pPr/>
-              <a:t>9 August 2017</a:t>
+              <a:t>15 August 2017</a:t>
             </a:fld>
             <a:endParaRPr lang="en-US" smtClean="0">
               <a:latin typeface="Times New Roman" pitchFamily="18" charset="0"/>
@@ -29120,7 +29120,7 @@
                 <a:latin typeface="Times New Roman" pitchFamily="18" charset="0"/>
               </a:rPr>
               <a:pPr/>
-              <a:t>9 August 2017</a:t>
+              <a:t>15 August 2017</a:t>
             </a:fld>
             <a:endParaRPr lang="en-US" smtClean="0">
               <a:latin typeface="Times New Roman" pitchFamily="18" charset="0"/>
@@ -29564,7 +29564,7 @@
                 <a:latin typeface="Times New Roman" pitchFamily="18" charset="0"/>
               </a:rPr>
               <a:pPr/>
-              <a:t>9 August 2017</a:t>
+              <a:t>15 August 2017</a:t>
             </a:fld>
             <a:endParaRPr lang="en-US" smtClean="0">
               <a:latin typeface="Times New Roman" pitchFamily="18" charset="0"/>
@@ -29716,7 +29716,7 @@
               <a:pPr>
                 <a:defRPr/>
               </a:pPr>
-              <a:t>9 August 2017</a:t>
+              <a:t>15 August 2017</a:t>
             </a:fld>
             <a:endParaRPr lang="en-US">
               <a:solidFill>
@@ -29809,6 +29809,14 @@
             <a:r>
               <a:rPr lang="en-US" dirty="0" err="1" smtClean="0"/>
               <a:t>walchko</a:t>
+            </a:r>
+            <a:endParaRPr lang="en-US" dirty="0" smtClean="0"/>
+          </a:p>
+          <a:p>
+            <a:pPr lvl="3"/>
+            <a:r>
+              <a:rPr lang="en-US" smtClean="0"/>
+              <a:t>GeorgeYork</a:t>
             </a:r>
             <a:endParaRPr lang="en-US" dirty="0" smtClean="0"/>
           </a:p>
@@ -30272,7 +30280,7 @@
                 <a:latin typeface="Times New Roman" pitchFamily="18" charset="0"/>
               </a:rPr>
               <a:pPr/>
-              <a:t>9 August 2017</a:t>
+              <a:t>15 August 2017</a:t>
             </a:fld>
             <a:endParaRPr lang="en-US" smtClean="0">
               <a:latin typeface="Times New Roman" pitchFamily="18" charset="0"/>
@@ -39318,7 +39326,7 @@
                 <a:latin typeface="Times New Roman" pitchFamily="18" charset="0"/>
               </a:rPr>
               <a:pPr/>
-              <a:t>9 August 2017</a:t>
+              <a:t>15 August 2017</a:t>
             </a:fld>
             <a:endParaRPr lang="en-US" smtClean="0">
               <a:latin typeface="Times New Roman" pitchFamily="18" charset="0"/>
@@ -39928,7 +39936,7 @@
                 <a:latin typeface="Times New Roman" pitchFamily="18" charset="0"/>
               </a:rPr>
               <a:pPr/>
-              <a:t>9 August 2017</a:t>
+              <a:t>15 August 2017</a:t>
             </a:fld>
             <a:endParaRPr lang="en-US" smtClean="0">
               <a:latin typeface="Times New Roman" pitchFamily="18" charset="0"/>
@@ -43791,24 +43799,6 @@
 </file>
 
 <file path=customXml/item1.xml><?xml version="1.0" encoding="utf-8"?>
-<?mso-contentType ?>
-<FormTemplates xmlns="http://schemas.microsoft.com/sharepoint/v3/contenttype/forms">
-  <Display>DocumentLibraryForm</Display>
-  <Edit>DocumentLibraryForm</Edit>
-  <New>DocumentLibraryForm</New>
-</FormTemplates>
-</file>
-
-<file path=customXml/item2.xml><?xml version="1.0" encoding="utf-8"?>
-<p:properties xmlns:p="http://schemas.microsoft.com/office/2006/metadata/properties" xmlns:xsi="http://www.w3.org/2001/XMLSchema-instance" xmlns:pc="http://schemas.microsoft.com/office/infopath/2007/PartnerControls">
-  <documentManagement>
-    <PublishingExpirationDate xmlns="http://schemas.microsoft.com/sharepoint/v3" xsi:nil="true"/>
-    <PublishingStartDate xmlns="http://schemas.microsoft.com/sharepoint/v3" xsi:nil="true"/>
-  </documentManagement>
-</p:properties>
-</file>
-
-<file path=customXml/item3.xml><?xml version="1.0" encoding="utf-8"?>
 <ct:contentTypeSchema xmlns:ct="http://schemas.microsoft.com/office/2006/metadata/contentType" xmlns:ma="http://schemas.microsoft.com/office/2006/metadata/properties/metaAttributes" ct:_="" ma:_="" ma:contentTypeName="Document" ma:contentTypeID="0x01010026B44337BE5C7D4193621DF98D151EB6" ma:contentTypeVersion="1" ma:contentTypeDescription="Create a new document." ma:contentTypeScope="" ma:versionID="97e7a7c9ce595270c3eaeb148770bcf7">
   <xsd:schema xmlns:xsd="http://www.w3.org/2001/XMLSchema" xmlns:xs="http://www.w3.org/2001/XMLSchema" xmlns:p="http://schemas.microsoft.com/office/2006/metadata/properties" xmlns:ns1="http://schemas.microsoft.com/sharepoint/v3" targetNamespace="http://schemas.microsoft.com/office/2006/metadata/properties" ma:root="true" ma:fieldsID="4dcce58c87e9fcebab8021569449a8d0" ns1:_="">
     <xsd:import namespace="http://schemas.microsoft.com/sharepoint/v3"/>
@@ -43940,10 +43930,38 @@
 </ct:contentTypeSchema>
 </file>
 
+<file path=customXml/item2.xml><?xml version="1.0" encoding="utf-8"?>
+<p:properties xmlns:p="http://schemas.microsoft.com/office/2006/metadata/properties" xmlns:xsi="http://www.w3.org/2001/XMLSchema-instance" xmlns:pc="http://schemas.microsoft.com/office/infopath/2007/PartnerControls">
+  <documentManagement>
+    <PublishingExpirationDate xmlns="http://schemas.microsoft.com/sharepoint/v3" xsi:nil="true"/>
+    <PublishingStartDate xmlns="http://schemas.microsoft.com/sharepoint/v3" xsi:nil="true"/>
+  </documentManagement>
+</p:properties>
+</file>
+
+<file path=customXml/item3.xml><?xml version="1.0" encoding="utf-8"?>
+<?mso-contentType ?>
+<FormTemplates xmlns="http://schemas.microsoft.com/sharepoint/v3/contenttype/forms">
+  <Display>DocumentLibraryForm</Display>
+  <Edit>DocumentLibraryForm</Edit>
+  <New>DocumentLibraryForm</New>
+</FormTemplates>
+</file>
+
 <file path=customXml/itemProps1.xml><?xml version="1.0" encoding="utf-8"?>
-<ds:datastoreItem xmlns:ds="http://schemas.openxmlformats.org/officeDocument/2006/customXml" ds:itemID="{7898C6F1-02C7-4807-8DB1-44412B5FAC7D}">
+<ds:datastoreItem xmlns:ds="http://schemas.openxmlformats.org/officeDocument/2006/customXml" ds:itemID="{9BDBC61A-8F22-4749-B0E2-3185185CFF04}">
   <ds:schemaRefs>
-    <ds:schemaRef ds:uri="http://schemas.microsoft.com/sharepoint/v3/contenttype/forms"/>
+    <ds:schemaRef ds:uri="http://schemas.microsoft.com/office/2006/metadata/contentType"/>
+    <ds:schemaRef ds:uri="http://schemas.microsoft.com/office/2006/metadata/properties/metaAttributes"/>
+    <ds:schemaRef ds:uri="http://www.w3.org/2001/XMLSchema"/>
+    <ds:schemaRef ds:uri="http://schemas.microsoft.com/office/2006/metadata/properties"/>
+    <ds:schemaRef ds:uri="http://schemas.microsoft.com/sharepoint/v3"/>
+    <ds:schemaRef ds:uri="http://schemas.microsoft.com/office/2006/documentManagement/types"/>
+    <ds:schemaRef ds:uri="http://schemas.microsoft.com/office/infopath/2007/PartnerControls"/>
+    <ds:schemaRef ds:uri="http://schemas.openxmlformats.org/package/2006/metadata/core-properties"/>
+    <ds:schemaRef ds:uri="http://purl.org/dc/elements/1.1/"/>
+    <ds:schemaRef ds:uri="http://purl.org/dc/terms/"/>
+    <ds:schemaRef ds:uri="http://schemas.microsoft.com/internal/obd"/>
   </ds:schemaRefs>
 </ds:datastoreItem>
 </file>
@@ -43965,19 +43983,9 @@
 </file>
 
 <file path=customXml/itemProps3.xml><?xml version="1.0" encoding="utf-8"?>
-<ds:datastoreItem xmlns:ds="http://schemas.openxmlformats.org/officeDocument/2006/customXml" ds:itemID="{9BDBC61A-8F22-4749-B0E2-3185185CFF04}">
+<ds:datastoreItem xmlns:ds="http://schemas.openxmlformats.org/officeDocument/2006/customXml" ds:itemID="{7898C6F1-02C7-4807-8DB1-44412B5FAC7D}">
   <ds:schemaRefs>
-    <ds:schemaRef ds:uri="http://schemas.microsoft.com/office/2006/metadata/contentType"/>
-    <ds:schemaRef ds:uri="http://schemas.microsoft.com/office/2006/metadata/properties/metaAttributes"/>
-    <ds:schemaRef ds:uri="http://www.w3.org/2001/XMLSchema"/>
-    <ds:schemaRef ds:uri="http://schemas.microsoft.com/office/2006/metadata/properties"/>
-    <ds:schemaRef ds:uri="http://schemas.microsoft.com/sharepoint/v3"/>
-    <ds:schemaRef ds:uri="http://schemas.microsoft.com/office/2006/documentManagement/types"/>
-    <ds:schemaRef ds:uri="http://schemas.microsoft.com/office/infopath/2007/PartnerControls"/>
-    <ds:schemaRef ds:uri="http://schemas.openxmlformats.org/package/2006/metadata/core-properties"/>
-    <ds:schemaRef ds:uri="http://purl.org/dc/elements/1.1/"/>
-    <ds:schemaRef ds:uri="http://purl.org/dc/terms/"/>
-    <ds:schemaRef ds:uri="http://schemas.microsoft.com/internal/obd"/>
+    <ds:schemaRef ds:uri="http://schemas.microsoft.com/sharepoint/v3/contenttype/forms"/>
   </ds:schemaRefs>
 </ds:datastoreItem>
 </file>
</xml_diff>